<commit_message>
a new doc: Linux NUMA Optimization
Signed-off-by: Yong Yang <yangoliver@gmail.com>
</commit_message>
<xml_diff>
--- a/slides/2016/linux_numa_optimization.pptx
+++ b/slides/2016/linux_numa_optimization.pptx
@@ -4246,7 +4246,7 @@
           <a:p>
             <a:fld id="{2B018CD0-E6D4-AF47-BBD1-2740817622D2}" type="datetimeFigureOut">
               <a:rPr lang="en-US" smtClean="0"/>
-              <a:t>5/14/16</a:t>
+              <a:t>17/9/14</a:t>
             </a:fld>
             <a:endParaRPr lang="en-US"/>
           </a:p>
@@ -4805,7 +4805,7 @@
           <a:p>
             <a:fld id="{74F7ECE0-13CD-6347-9B06-CB217BF409A4}" type="datetimeFigureOut">
               <a:rPr lang="en-US" smtClean="0"/>
-              <a:t>5/14/16</a:t>
+              <a:t>17/9/14</a:t>
             </a:fld>
             <a:endParaRPr lang="en-US"/>
           </a:p>
@@ -4996,7 +4996,7 @@
           <a:p>
             <a:fld id="{74F7ECE0-13CD-6347-9B06-CB217BF409A4}" type="datetimeFigureOut">
               <a:rPr lang="en-US" smtClean="0"/>
-              <a:t>5/14/16</a:t>
+              <a:t>17/9/14</a:t>
             </a:fld>
             <a:endParaRPr lang="en-US"/>
           </a:p>
@@ -5181,7 +5181,7 @@
           <a:p>
             <a:fld id="{74F7ECE0-13CD-6347-9B06-CB217BF409A4}" type="datetimeFigureOut">
               <a:rPr lang="en-US" smtClean="0"/>
-              <a:t>5/14/16</a:t>
+              <a:t>17/9/14</a:t>
             </a:fld>
             <a:endParaRPr lang="en-US"/>
           </a:p>
@@ -5444,7 +5444,7 @@
           <a:p>
             <a:fld id="{74F7ECE0-13CD-6347-9B06-CB217BF409A4}" type="datetimeFigureOut">
               <a:rPr lang="en-US" smtClean="0"/>
-              <a:t>5/14/16</a:t>
+              <a:t>17/9/14</a:t>
             </a:fld>
             <a:endParaRPr lang="en-US"/>
           </a:p>
@@ -5860,7 +5860,7 @@
           <a:p>
             <a:fld id="{74F7ECE0-13CD-6347-9B06-CB217BF409A4}" type="datetimeFigureOut">
               <a:rPr lang="en-US" smtClean="0"/>
-              <a:t>5/14/16</a:t>
+              <a:t>17/9/14</a:t>
             </a:fld>
             <a:endParaRPr lang="en-US"/>
           </a:p>
@@ -6102,7 +6102,7 @@
           <a:p>
             <a:fld id="{74F7ECE0-13CD-6347-9B06-CB217BF409A4}" type="datetimeFigureOut">
               <a:rPr lang="en-US" smtClean="0"/>
-              <a:t>5/14/16</a:t>
+              <a:t>17/9/14</a:t>
             </a:fld>
             <a:endParaRPr lang="en-US"/>
           </a:p>
@@ -6338,7 +6338,7 @@
           <a:p>
             <a:fld id="{74F7ECE0-13CD-6347-9B06-CB217BF409A4}" type="datetimeFigureOut">
               <a:rPr lang="en-US" smtClean="0"/>
-              <a:t>5/14/16</a:t>
+              <a:t>17/9/14</a:t>
             </a:fld>
             <a:endParaRPr lang="en-US"/>
           </a:p>
@@ -6533,7 +6533,7 @@
           <a:p>
             <a:fld id="{74F7ECE0-13CD-6347-9B06-CB217BF409A4}" type="datetimeFigureOut">
               <a:rPr lang="en-US" smtClean="0"/>
-              <a:t>5/14/16</a:t>
+              <a:t>17/9/14</a:t>
             </a:fld>
             <a:endParaRPr lang="en-US"/>
           </a:p>
@@ -6631,7 +6631,7 @@
           <a:p>
             <a:fld id="{74F7ECE0-13CD-6347-9B06-CB217BF409A4}" type="datetimeFigureOut">
               <a:rPr lang="en-US" smtClean="0"/>
-              <a:t>5/14/16</a:t>
+              <a:t>17/9/14</a:t>
             </a:fld>
             <a:endParaRPr lang="en-US"/>
           </a:p>
@@ -6767,7 +6767,7 @@
           <a:p>
             <a:fld id="{74F7ECE0-13CD-6347-9B06-CB217BF409A4}" type="datetimeFigureOut">
               <a:rPr lang="en-US" smtClean="0"/>
-              <a:t>5/14/16</a:t>
+              <a:t>17/9/14</a:t>
             </a:fld>
             <a:endParaRPr lang="en-US"/>
           </a:p>
@@ -7285,7 +7285,7 @@
           <a:p>
             <a:fld id="{74F7ECE0-13CD-6347-9B06-CB217BF409A4}" type="datetimeFigureOut">
               <a:rPr lang="en-US" smtClean="0"/>
-              <a:t>5/14/16</a:t>
+              <a:t>17/9/14</a:t>
             </a:fld>
             <a:endParaRPr lang="en-US"/>
           </a:p>
@@ -7546,7 +7546,7 @@
           <a:p>
             <a:fld id="{74F7ECE0-13CD-6347-9B06-CB217BF409A4}" type="datetimeFigureOut">
               <a:rPr lang="en-US" smtClean="0"/>
-              <a:t>5/14/16</a:t>
+              <a:t>17/9/14</a:t>
             </a:fld>
             <a:endParaRPr lang="en-US"/>
           </a:p>
@@ -29398,19 +29398,7 @@
               <a:rPr lang="en-US" dirty="0" smtClean="0">
                 <a:latin typeface="Arial" charset="0"/>
               </a:rPr>
-              <a:t>end-to-end affinity </a:t>
-            </a:r>
-            <a:r>
-              <a:rPr lang="en-US" dirty="0" smtClean="0">
-                <a:latin typeface="Arial" charset="0"/>
-              </a:rPr>
-              <a:t>from kernel to</a:t>
-            </a:r>
-            <a:r>
-              <a:rPr lang="en-US" dirty="0" smtClean="0">
-                <a:latin typeface="Arial" charset="0"/>
-              </a:rPr>
-              <a:t> </a:t>
+              <a:t>end-to-end affinity from kernel to </a:t>
             </a:r>
             <a:r>
               <a:rPr lang="en-US" dirty="0">
@@ -29558,7 +29546,7 @@
           <a:lstStyle/>
           <a:p>
             <a:r>
-              <a:rPr lang="en-US" sz="2400">
+              <a:rPr lang="en-US" sz="2400" dirty="0">
                 <a:latin typeface="Arial" charset="0"/>
               </a:rPr>
               <a:t>Overview</a:t>
@@ -29566,7 +29554,7 @@
           </a:p>
           <a:p>
             <a:r>
-              <a:rPr lang="en-US" sz="2400">
+              <a:rPr lang="en-US" sz="2400" dirty="0">
                 <a:latin typeface="Arial" charset="0"/>
               </a:rPr>
               <a:t>Kernel Facilities</a:t>
@@ -29574,7 +29562,7 @@
           </a:p>
           <a:p>
             <a:r>
-              <a:rPr lang="en-US" sz="2400">
+              <a:rPr lang="en-US" sz="2400" dirty="0">
                 <a:solidFill>
                   <a:srgbClr val="FF0000"/>
                 </a:solidFill>
@@ -29585,11 +29573,14 @@
           </a:p>
           <a:p>
             <a:r>
-              <a:rPr lang="en-US" sz="2400">
-                <a:latin typeface="Arial" charset="0"/>
-              </a:rPr>
-              <a:t>Opportunities</a:t>
-            </a:r>
+              <a:rPr lang="en-US" altLang="zh-CN" sz="2400" dirty="0">
+                <a:latin typeface="Arial" charset="0"/>
+              </a:rPr>
+              <a:t>Tools</a:t>
+            </a:r>
+            <a:endParaRPr lang="en-US" sz="2400" dirty="0">
+              <a:latin typeface="Arial" charset="0"/>
+            </a:endParaRPr>
           </a:p>
         </p:txBody>
       </p:sp>
@@ -30422,7 +30413,7 @@
           <a:lstStyle/>
           <a:p>
             <a:r>
-              <a:rPr lang="en-US" sz="2400">
+              <a:rPr lang="en-US" sz="2400" dirty="0">
                 <a:solidFill>
                   <a:srgbClr val="FF0000"/>
                 </a:solidFill>
@@ -30433,7 +30424,7 @@
           </a:p>
           <a:p>
             <a:r>
-              <a:rPr lang="en-US" sz="2400">
+              <a:rPr lang="en-US" sz="2400" dirty="0">
                 <a:latin typeface="Arial" charset="0"/>
               </a:rPr>
               <a:t>Kernel Facilities</a:t>
@@ -30441,7 +30432,7 @@
           </a:p>
           <a:p>
             <a:r>
-              <a:rPr lang="en-US" sz="2400">
+              <a:rPr lang="en-US" sz="2400" dirty="0">
                 <a:latin typeface="Arial" charset="0"/>
               </a:rPr>
               <a:t>Known Gaps</a:t>
@@ -30449,11 +30440,14 @@
           </a:p>
           <a:p>
             <a:r>
-              <a:rPr lang="en-US" sz="2400">
-                <a:latin typeface="Arial" charset="0"/>
-              </a:rPr>
-              <a:t>Opportunities</a:t>
-            </a:r>
+              <a:rPr lang="en-US" sz="2400" dirty="0" smtClean="0">
+                <a:latin typeface="Arial" charset="0"/>
+              </a:rPr>
+              <a:t>Tools</a:t>
+            </a:r>
+            <a:endParaRPr lang="en-US" sz="2400" dirty="0">
+              <a:latin typeface="Arial" charset="0"/>
+            </a:endParaRPr>
           </a:p>
         </p:txBody>
       </p:sp>
@@ -31030,7 +31024,7 @@
           <a:lstStyle/>
           <a:p>
             <a:r>
-              <a:rPr lang="en-US" sz="2400">
+              <a:rPr lang="en-US" sz="2400" dirty="0">
                 <a:latin typeface="Arial" charset="0"/>
               </a:rPr>
               <a:t>Overview</a:t>
@@ -31038,7 +31032,7 @@
           </a:p>
           <a:p>
             <a:r>
-              <a:rPr lang="en-US" sz="2400">
+              <a:rPr lang="en-US" sz="2400" dirty="0">
                 <a:latin typeface="Arial" charset="0"/>
               </a:rPr>
               <a:t>Kernel Facilities</a:t>
@@ -31046,7 +31040,7 @@
           </a:p>
           <a:p>
             <a:r>
-              <a:rPr lang="en-US" sz="2400">
+              <a:rPr lang="en-US" sz="2400" dirty="0">
                 <a:latin typeface="Arial" charset="0"/>
               </a:rPr>
               <a:t>Known Gaps</a:t>
@@ -31054,14 +31048,20 @@
           </a:p>
           <a:p>
             <a:r>
-              <a:rPr lang="en-US" sz="2400">
+              <a:rPr lang="en-US" sz="2400" dirty="0" smtClean="0">
                 <a:solidFill>
                   <a:srgbClr val="FF0000"/>
                 </a:solidFill>
                 <a:latin typeface="Arial" charset="0"/>
               </a:rPr>
-              <a:t>Opportunities</a:t>
-            </a:r>
+              <a:t>Tools</a:t>
+            </a:r>
+            <a:endParaRPr lang="en-US" sz="2400" dirty="0">
+              <a:solidFill>
+                <a:srgbClr val="FF0000"/>
+              </a:solidFill>
+              <a:latin typeface="Arial" charset="0"/>
+            </a:endParaRPr>
           </a:p>
         </p:txBody>
       </p:sp>
@@ -33167,7 +33167,7 @@
           <a:lstStyle/>
           <a:p>
             <a:r>
-              <a:rPr lang="en-US" sz="2400">
+              <a:rPr lang="en-US" sz="2400" dirty="0">
                 <a:latin typeface="Arial" charset="0"/>
               </a:rPr>
               <a:t>Overview</a:t>
@@ -33175,7 +33175,7 @@
           </a:p>
           <a:p>
             <a:r>
-              <a:rPr lang="en-US" sz="2400">
+              <a:rPr lang="en-US" sz="2400" dirty="0">
                 <a:solidFill>
                   <a:srgbClr val="FF0000"/>
                 </a:solidFill>
@@ -33186,7 +33186,7 @@
           </a:p>
           <a:p>
             <a:r>
-              <a:rPr lang="en-US" sz="2400">
+              <a:rPr lang="en-US" sz="2400" dirty="0">
                 <a:latin typeface="Arial" charset="0"/>
               </a:rPr>
               <a:t>Known Gaps</a:t>
@@ -33194,11 +33194,14 @@
           </a:p>
           <a:p>
             <a:r>
-              <a:rPr lang="en-US" sz="2400">
-                <a:latin typeface="Arial" charset="0"/>
-              </a:rPr>
-              <a:t>Opportunities</a:t>
-            </a:r>
+              <a:rPr lang="en-US" altLang="zh-CN" sz="2400" dirty="0">
+                <a:latin typeface="Arial" charset="0"/>
+              </a:rPr>
+              <a:t>Tools</a:t>
+            </a:r>
+            <a:endParaRPr lang="en-US" sz="2400" dirty="0">
+              <a:latin typeface="Arial" charset="0"/>
+            </a:endParaRPr>
           </a:p>
         </p:txBody>
       </p:sp>

</xml_diff>